<commit_message>
edit soln PS_choose_isomorphic_graphs; timing slides8f
</commit_message>
<xml_diff>
--- a/fall11/slidesF11/slides8f.pptx
+++ b/fall11/slidesF11/slides8f.pptx
@@ -17581,7 +17581,7 @@
           <a:graphicData uri="http://schemas.openxmlformats.org/presentationml/2006/ole">
             <mc:AlternateContent xmlns:mc="http://schemas.openxmlformats.org/markup-compatibility/2006">
               <mc:Choice xmlns:v="urn:schemas-microsoft-com:vml" Requires="v">
-                <p:oleObj spid="_x0000_s81935" name="Equation" r:id="rId4" imgW="914400" imgH="198720" progId="Equation.DSMT4">
+                <p:oleObj spid="_x0000_s81937" name="Equation" r:id="rId4" imgW="914400" imgH="198720" progId="Equation.DSMT4">
                   <p:embed/>
                 </p:oleObj>
               </mc:Choice>
@@ -21967,6 +21967,9 @@
   <p:clrMapOvr>
     <a:masterClrMapping/>
   </p:clrMapOvr>
+  <p:transition xmlns:p14="http://schemas.microsoft.com/office/powerpoint/2010/main" spd="slow">
+    <p:fade thruBlk="1"/>
+  </p:transition>
   <p:timing>
     <p:tnLst>
       <p:par>
@@ -24053,7 +24056,7 @@
           <a:graphicData uri="http://schemas.openxmlformats.org/presentationml/2006/ole">
             <mc:AlternateContent xmlns:mc="http://schemas.openxmlformats.org/markup-compatibility/2006">
               <mc:Choice xmlns:v="urn:schemas-microsoft-com:vml" Requires="v">
-                <p:oleObj spid="_x0000_s5135" name="Equation" r:id="rId4" imgW="1904760" imgH="279360" progId="Equation.DSMT4">
+                <p:oleObj spid="_x0000_s5137" name="Equation" r:id="rId4" imgW="1904760" imgH="279360" progId="Equation.DSMT4">
                   <p:embed/>
                 </p:oleObj>
               </mc:Choice>
@@ -33204,6 +33207,18 @@
   <p:clrMapOvr>
     <a:masterClrMapping/>
   </p:clrMapOvr>
+  <mc:AlternateContent xmlns:mc="http://schemas.openxmlformats.org/markup-compatibility/2006">
+    <mc:Choice xmlns:p14="http://schemas.microsoft.com/office/powerpoint/2010/main" Requires="p14">
+      <p:transition spd="med" p14:dur="700">
+        <p:fade thruBlk="1"/>
+      </p:transition>
+    </mc:Choice>
+    <mc:Fallback>
+      <p:transition xmlns:p14="http://schemas.microsoft.com/office/powerpoint/2010/main" spd="med">
+        <p:fade thruBlk="1"/>
+      </p:transition>
+    </mc:Fallback>
+  </mc:AlternateContent>
   <p:timing>
     <p:tnLst>
       <p:par>

</xml_diff>